<commit_message>
Updated slides & fixed a grammatical error
</commit_message>
<xml_diff>
--- a/CMSI402 Project Proposal.pptx
+++ b/CMSI402 Project Proposal.pptx
@@ -3321,6 +3321,13 @@
   <p:clrMapOvr>
     <a:masterClrMapping/>
   </p:clrMapOvr>
+  <p:timing>
+    <p:tnLst>
+      <p:par>
+        <p:cTn id="1" dur="indefinite" restart="never" nodeType="tmRoot"/>
+      </p:par>
+    </p:tnLst>
+  </p:timing>
 </p:sld>
 </file>
 
@@ -3393,11 +3400,7 @@
           <a:p>
             <a:r>
               <a:rPr lang="en-US" dirty="0" smtClean="0"/>
-              <a:t>Move </a:t>
-            </a:r>
-            <a:r>
-              <a:rPr lang="en-US" dirty="0"/>
-              <a:t>towards online connectivity/split screen. </a:t>
+              <a:t>Implement puzzles, traversal, and shooting</a:t>
             </a:r>
           </a:p>
           <a:p>
@@ -3432,7 +3435,7 @@
         </p:blipFill>
         <p:spPr>
           <a:xfrm>
-            <a:off x="6338888" y="2865596"/>
+            <a:off x="5690489" y="2865219"/>
             <a:ext cx="4270375" cy="2647632"/>
           </a:xfrm>
         </p:spPr>
@@ -3447,6 +3450,13 @@
   <p:clrMapOvr>
     <a:masterClrMapping/>
   </p:clrMapOvr>
+  <p:timing>
+    <p:tnLst>
+      <p:par>
+        <p:cTn id="1" dur="indefinite" restart="never" nodeType="tmRoot"/>
+      </p:par>
+    </p:tnLst>
+  </p:timing>
 </p:sld>
 </file>
 
@@ -3544,25 +3554,19 @@
           <a:p>
             <a:r>
               <a:rPr lang="en-US" dirty="0"/>
-              <a:t>Start off with a horde mode</a:t>
-            </a:r>
-          </a:p>
-          <a:p>
-            <a:r>
-              <a:rPr lang="en-US" dirty="0"/>
-              <a:t>Ultimately create </a:t>
+              <a:t>Start off with a </a:t>
             </a:r>
             <a:r>
               <a:rPr lang="en-US" dirty="0" smtClean="0"/>
-              <a:t>an online PVP </a:t>
-            </a:r>
-            <a:r>
-              <a:rPr lang="en-US" dirty="0"/>
-              <a:t>mode</a:t>
-            </a:r>
-          </a:p>
-          <a:p>
-            <a:endParaRPr lang="en-US" dirty="0" smtClean="0"/>
+              <a:t>single player demo level (Point A to B)</a:t>
+            </a:r>
+            <a:endParaRPr lang="en-US" dirty="0"/>
+          </a:p>
+          <a:p>
+            <a:r>
+              <a:rPr lang="en-US" dirty="0" smtClean="0"/>
+              <a:t>Move towards 2 player mode (split screen, then online)</a:t>
+            </a:r>
           </a:p>
         </p:txBody>
       </p:sp>
@@ -3582,7 +3586,77 @@
         <p:cTn id="1" dur="indefinite" restart="never" nodeType="tmRoot">
           <p:childTnLst>
             <p:seq concurrent="1" nextAc="seek">
-              <p:cTn id="2" restart="whenNotActive" fill="hold" evtFilter="cancelBubble" nodeType="interactiveSeq">
+              <p:cTn id="2" dur="indefinite" nodeType="mainSeq">
+                <p:childTnLst>
+                  <p:par>
+                    <p:cTn id="3" fill="hold">
+                      <p:stCondLst>
+                        <p:cond delay="indefinite"/>
+                        <p:cond evt="onBegin" delay="0">
+                          <p:tn val="2"/>
+                        </p:cond>
+                      </p:stCondLst>
+                      <p:childTnLst>
+                        <p:par>
+                          <p:cTn id="4" fill="hold">
+                            <p:stCondLst>
+                              <p:cond delay="0"/>
+                            </p:stCondLst>
+                            <p:childTnLst>
+                              <p:par>
+                                <p:cTn id="5" presetID="1" presetClass="mediacall" presetSubtype="0" fill="hold" nodeType="afterEffect">
+                                  <p:stCondLst>
+                                    <p:cond delay="0"/>
+                                  </p:stCondLst>
+                                  <p:childTnLst>
+                                    <p:cmd type="call" cmd="playFrom(0.0)">
+                                      <p:cBhvr>
+                                        <p:cTn id="6" dur="7367" fill="hold"/>
+                                        <p:tgtEl>
+                                          <p:spTgt spid="7"/>
+                                        </p:tgtEl>
+                                      </p:cBhvr>
+                                    </p:cmd>
+                                  </p:childTnLst>
+                                </p:cTn>
+                              </p:par>
+                            </p:childTnLst>
+                          </p:cTn>
+                        </p:par>
+                      </p:childTnLst>
+                    </p:cTn>
+                  </p:par>
+                </p:childTnLst>
+              </p:cTn>
+              <p:prevCondLst>
+                <p:cond evt="onPrev" delay="0">
+                  <p:tgtEl>
+                    <p:sldTgt/>
+                  </p:tgtEl>
+                </p:cond>
+              </p:prevCondLst>
+              <p:nextCondLst>
+                <p:cond evt="onNext" delay="0">
+                  <p:tgtEl>
+                    <p:sldTgt/>
+                  </p:tgtEl>
+                </p:cond>
+              </p:nextCondLst>
+            </p:seq>
+            <p:video>
+              <p:cMediaNode vol="80000">
+                <p:cTn id="7" repeatCount="indefinite" fill="hold" display="0">
+                  <p:stCondLst>
+                    <p:cond delay="indefinite"/>
+                  </p:stCondLst>
+                </p:cTn>
+                <p:tgtEl>
+                  <p:spTgt spid="7"/>
+                </p:tgtEl>
+              </p:cMediaNode>
+            </p:video>
+            <p:seq concurrent="1" nextAc="seek">
+              <p:cTn id="8" restart="whenNotActive" fill="hold" evtFilter="cancelBubble" nodeType="interactiveSeq">
                 <p:stCondLst>
                   <p:cond evt="onClick" delay="0">
                     <p:tgtEl>
@@ -3595,26 +3669,26 @@
                 </p:endSync>
                 <p:childTnLst>
                   <p:par>
-                    <p:cTn id="3" fill="hold">
+                    <p:cTn id="9" fill="hold">
                       <p:stCondLst>
                         <p:cond delay="0"/>
                       </p:stCondLst>
                       <p:childTnLst>
                         <p:par>
-                          <p:cTn id="4" fill="hold">
+                          <p:cTn id="10" fill="hold">
                             <p:stCondLst>
                               <p:cond delay="0"/>
                             </p:stCondLst>
                             <p:childTnLst>
                               <p:par>
-                                <p:cTn id="5" presetID="2" presetClass="mediacall" presetSubtype="0" fill="hold" nodeType="clickEffect">
+                                <p:cTn id="11" presetID="2" presetClass="mediacall" presetSubtype="0" fill="hold" nodeType="clickEffect">
                                   <p:stCondLst>
                                     <p:cond delay="0"/>
                                   </p:stCondLst>
                                   <p:childTnLst>
                                     <p:cmd type="call" cmd="togglePause">
                                       <p:cBhvr>
-                                        <p:cTn id="6" dur="1" fill="hold"/>
+                                        <p:cTn id="12" dur="1" fill="hold"/>
                                         <p:tgtEl>
                                           <p:spTgt spid="7"/>
                                         </p:tgtEl>
@@ -3639,18 +3713,6 @@
                 </p:cond>
               </p:nextCondLst>
             </p:seq>
-            <p:video>
-              <p:cMediaNode vol="80000">
-                <p:cTn id="7" fill="hold" display="0">
-                  <p:stCondLst>
-                    <p:cond delay="indefinite"/>
-                  </p:stCondLst>
-                </p:cTn>
-                <p:tgtEl>
-                  <p:spTgt spid="7"/>
-                </p:tgtEl>
-              </p:cMediaNode>
-            </p:video>
           </p:childTnLst>
         </p:cTn>
       </p:par>
@@ -3734,10 +3796,20 @@
             <a:pPr lvl="1"/>
             <a:r>
               <a:rPr lang="en-US" dirty="0"/>
-              <a:t>Expressing my creativity by creating a game inspired by some of my favorite games. </a:t>
-            </a:r>
-          </a:p>
-          <a:p>
+              <a:t>Expressing my </a:t>
+            </a:r>
+            <a:r>
+              <a:rPr lang="en-US" dirty="0" smtClean="0"/>
+              <a:t>imagination </a:t>
+            </a:r>
+            <a:r>
+              <a:rPr lang="en-US" dirty="0"/>
+              <a:t>by creating a </a:t>
+            </a:r>
+            <a:r>
+              <a:rPr lang="en-US" dirty="0" smtClean="0"/>
+              <a:t>game</a:t>
+            </a:r>
             <a:endParaRPr lang="en-US" dirty="0"/>
           </a:p>
         </p:txBody>
@@ -3771,8 +3843,43 @@
           <a:p>
             <a:pPr lvl="1"/>
             <a:r>
+              <a:rPr lang="en-US"/>
+              <a:t>Move towards 2 player mode (split screen, </a:t>
+            </a:r>
+            <a:r>
+              <a:rPr lang="en-US"/>
+              <a:t>then </a:t>
+            </a:r>
+            <a:r>
+              <a:rPr lang="en-US" smtClean="0"/>
+              <a:t>online</a:t>
+            </a:r>
+            <a:r>
+              <a:rPr lang="en-US"/>
+              <a:t>)</a:t>
+            </a:r>
+            <a:endParaRPr lang="en-US" dirty="0" smtClean="0"/>
+          </a:p>
+          <a:p>
+            <a:pPr lvl="1"/>
+            <a:r>
+              <a:rPr lang="en-US" dirty="0" smtClean="0"/>
+              <a:t>Customization</a:t>
+            </a:r>
+            <a:r>
               <a:rPr lang="en-US" dirty="0"/>
-              <a:t>Eventually work towards making a story-driven campaign.</a:t>
+              <a:t>!</a:t>
+            </a:r>
+          </a:p>
+          <a:p>
+            <a:pPr lvl="1"/>
+            <a:r>
+              <a:rPr lang="en-US" dirty="0" smtClean="0"/>
+              <a:t>Eventually </a:t>
+            </a:r>
+            <a:r>
+              <a:rPr lang="en-US" dirty="0"/>
+              <a:t>work towards making a story-driven campaign.</a:t>
             </a:r>
           </a:p>
           <a:p>
@@ -3782,15 +3889,38 @@
               <a:t>Implement a Team Deathmatch &amp; PVP mode. </a:t>
             </a:r>
           </a:p>
-          <a:p>
-            <a:pPr lvl="1"/>
-            <a:r>
-              <a:rPr lang="en-US" dirty="0" smtClean="0"/>
-              <a:t>Customization!</a:t>
-            </a:r>
-          </a:p>
-        </p:txBody>
-      </p:sp>
+        </p:txBody>
+      </p:sp>
+      <p:pic>
+        <p:nvPicPr>
+          <p:cNvPr id="6" name="Picture 5"/>
+          <p:cNvPicPr>
+            <a:picLocks noChangeAspect="1"/>
+          </p:cNvPicPr>
+          <p:nvPr/>
+        </p:nvPicPr>
+        <p:blipFill>
+          <a:blip r:embed="rId2">
+            <a:extLst>
+              <a:ext uri="{28A0092B-C50C-407E-A947-70E740481C1C}">
+                <a14:useLocalDpi xmlns:a14="http://schemas.microsoft.com/office/drawing/2010/main" val="0"/>
+              </a:ext>
+            </a:extLst>
+          </a:blip>
+          <a:stretch>
+            <a:fillRect/>
+          </a:stretch>
+        </p:blipFill>
+        <p:spPr>
+          <a:xfrm>
+            <a:off x="1704466" y="4077437"/>
+            <a:ext cx="4026661" cy="2516663"/>
+          </a:xfrm>
+          <a:prstGeom prst="rect">
+            <a:avLst/>
+          </a:prstGeom>
+        </p:spPr>
+      </p:pic>
     </p:spTree>
     <p:extLst>
       <p:ext uri="{BB962C8B-B14F-4D97-AF65-F5344CB8AC3E}">
@@ -3801,6 +3931,13 @@
   <p:clrMapOvr>
     <a:masterClrMapping/>
   </p:clrMapOvr>
+  <p:timing>
+    <p:tnLst>
+      <p:par>
+        <p:cTn id="1" dur="indefinite" restart="never" nodeType="tmRoot"/>
+      </p:par>
+    </p:tnLst>
+  </p:timing>
 </p:sld>
 </file>
 
@@ -3844,30 +3981,6 @@
           </a:p>
         </p:txBody>
       </p:sp>
-      <p:pic>
-        <p:nvPicPr>
-          <p:cNvPr id="4" name="Picture 3"/>
-          <p:cNvPicPr>
-            <a:picLocks noChangeAspect="1"/>
-          </p:cNvPicPr>
-          <p:nvPr/>
-        </p:nvPicPr>
-        <p:blipFill>
-          <a:blip r:embed="rId2"/>
-          <a:stretch>
-            <a:fillRect/>
-          </a:stretch>
-        </p:blipFill>
-        <p:spPr>
-          <a:xfrm>
-            <a:off x="3397520" y="2310713"/>
-            <a:ext cx="5396960" cy="4386649"/>
-          </a:xfrm>
-          <a:prstGeom prst="rect">
-            <a:avLst/>
-          </a:prstGeom>
-        </p:spPr>
-      </p:pic>
     </p:spTree>
     <p:extLst>
       <p:ext uri="{BB962C8B-B14F-4D97-AF65-F5344CB8AC3E}">
@@ -3878,6 +3991,13 @@
   <p:clrMapOvr>
     <a:masterClrMapping/>
   </p:clrMapOvr>
+  <p:timing>
+    <p:tnLst>
+      <p:par>
+        <p:cTn id="1" dur="indefinite" restart="never" nodeType="tmRoot"/>
+      </p:par>
+    </p:tnLst>
+  </p:timing>
 </p:sld>
 </file>
 

</xml_diff>